<commit_message>
fix: add point to frontend plan
</commit_message>
<xml_diff>
--- a/отчёты о проделанной работе/Отчёт о проделанной работе.pptx
+++ b/отчёты о проделанной работе/Отчёт о проделанной работе.pptx
@@ -8622,6 +8622,19 @@
               <a:rPr lang="ru-RU" dirty="0"/>
               <a:t>запросы</a:t>
             </a:r>
+            <a:endParaRPr lang="en-US" dirty="0"/>
+          </a:p>
+          <a:p>
+            <a:pPr lvl="1"/>
+            <a:r>
+              <a:rPr lang="ru-RU" dirty="0"/>
+              <a:t>Сделать сервисную страницу для </a:t>
+            </a:r>
+            <a:r>
+              <a:rPr lang="ru-RU"/>
+              <a:t>администратора вендора</a:t>
+            </a:r>
+            <a:endParaRPr lang="ru-RU" dirty="0"/>
           </a:p>
         </p:txBody>
       </p:sp>

</xml_diff>